<commit_message>
add name to the slides
</commit_message>
<xml_diff>
--- a/slides/containers-namespace-cgroups.pptx
+++ b/slides/containers-namespace-cgroups.pptx
@@ -5169,7 +5169,12 @@
             <p:ph type="ctrTitle"/>
           </p:nvPr>
         </p:nvSpPr>
-        <p:spPr/>
+        <p:spPr>
+          <a:xfrm>
+            <a:off x="1524000" y="158976"/>
+            <a:ext cx="9144000" cy="2387600"/>
+          </a:xfrm>
+        </p:spPr>
         <p:txBody>
           <a:bodyPr/>
           <a:lstStyle/>
@@ -5201,28 +5206,53 @@
             <p:ph type="subTitle" idx="1"/>
           </p:nvPr>
         </p:nvSpPr>
-        <p:spPr/>
+        <p:spPr>
+          <a:xfrm>
+            <a:off x="1524000" y="2638651"/>
+            <a:ext cx="9144000" cy="1655762"/>
+          </a:xfrm>
+        </p:spPr>
         <p:txBody>
           <a:bodyPr/>
           <a:lstStyle/>
           <a:p>
             <a:r>
-              <a:rPr lang="en-US" dirty="0"/>
+              <a:rPr lang="en-US" sz="3200" dirty="0"/>
               <a:t>Namespaces &amp; Control Groups</a:t>
             </a:r>
+            <a:br>
+              <a:rPr lang="en-US" sz="3200" dirty="0"/>
+            </a:br>
+            <a:endParaRPr lang="en-US" sz="3200" dirty="0"/>
+          </a:p>
+          <a:p>
+            <a:r>
+              <a:rPr lang="en-US" sz="2800" b="1" dirty="0" err="1"/>
+              <a:t>Senthilnathan</a:t>
+            </a:r>
+            <a:r>
+              <a:rPr lang="en-US" sz="2800" b="1" dirty="0"/>
+              <a:t> N</a:t>
+            </a:r>
+            <a:br>
+              <a:rPr lang="en-US" sz="2800" dirty="0"/>
+            </a:br>
+            <a:endParaRPr lang="en-US" sz="2800" dirty="0"/>
+          </a:p>
+          <a:p>
+            <a:r>
+              <a:rPr lang="en-US" sz="2800" dirty="0"/>
+              <a:t>Research Scientist</a:t>
+            </a:r>
+          </a:p>
+          <a:p>
+            <a:r>
+              <a:rPr lang="en-US" sz="2800" dirty="0"/>
+              <a:t>IBM Research, India</a:t>
+            </a:r>
           </a:p>
           <a:p>
             <a:endParaRPr lang="en-US" dirty="0"/>
-          </a:p>
-          <a:p>
-            <a:r>
-              <a:rPr lang="en-US" dirty="0" err="1"/>
-              <a:t>Senthilnathan</a:t>
-            </a:r>
-            <a:r>
-              <a:rPr lang="en-US" dirty="0"/>
-              <a:t> N</a:t>
-            </a:r>
           </a:p>
           <a:p>
             <a:endParaRPr lang="en-US" dirty="0"/>
@@ -28347,7 +28377,7 @@
                 <a:latin typeface="Times New Roman" panose="02020603050405020304" pitchFamily="18" charset="0"/>
                 <a:cs typeface="Times New Roman" panose="02020603050405020304" pitchFamily="18" charset="0"/>
               </a:rPr>
-              <a:t>Change the hostname to the desired</a:t>
+              <a:t>Change the hostname to the desired one</a:t>
             </a:r>
           </a:p>
           <a:p>

</xml_diff>